<commit_message>
Add NMR sections, cysteine figure and edits from DL and DLM.
</commit_message>
<xml_diff>
--- a/figures/chemical_structures_figure/SAMPL6_pKa_molecules_fig.pptx
+++ b/figures/chemical_structures_figure/SAMPL6_pKa_molecules_fig.pptx
@@ -288,7 +288,7 @@
           <a:p>
             <a:fld id="{5CCE303C-61B3-6B4B-86C2-B0455BB704B3}" type="datetimeFigureOut">
               <a:rPr lang="en-US" smtClean="0"/>
-              <a:t>5/22/18</a:t>
+              <a:t>6/4/18</a:t>
             </a:fld>
             <a:endParaRPr lang="en-US"/>
           </a:p>
@@ -458,7 +458,7 @@
           <a:p>
             <a:fld id="{5CCE303C-61B3-6B4B-86C2-B0455BB704B3}" type="datetimeFigureOut">
               <a:rPr lang="en-US" smtClean="0"/>
-              <a:t>5/22/18</a:t>
+              <a:t>6/4/18</a:t>
             </a:fld>
             <a:endParaRPr lang="en-US"/>
           </a:p>
@@ -638,7 +638,7 @@
           <a:p>
             <a:fld id="{5CCE303C-61B3-6B4B-86C2-B0455BB704B3}" type="datetimeFigureOut">
               <a:rPr lang="en-US" smtClean="0"/>
-              <a:t>5/22/18</a:t>
+              <a:t>6/4/18</a:t>
             </a:fld>
             <a:endParaRPr lang="en-US"/>
           </a:p>
@@ -808,7 +808,7 @@
           <a:p>
             <a:fld id="{5CCE303C-61B3-6B4B-86C2-B0455BB704B3}" type="datetimeFigureOut">
               <a:rPr lang="en-US" smtClean="0"/>
-              <a:t>5/22/18</a:t>
+              <a:t>6/4/18</a:t>
             </a:fld>
             <a:endParaRPr lang="en-US"/>
           </a:p>
@@ -1054,7 +1054,7 @@
           <a:p>
             <a:fld id="{5CCE303C-61B3-6B4B-86C2-B0455BB704B3}" type="datetimeFigureOut">
               <a:rPr lang="en-US" smtClean="0"/>
-              <a:t>5/22/18</a:t>
+              <a:t>6/4/18</a:t>
             </a:fld>
             <a:endParaRPr lang="en-US"/>
           </a:p>
@@ -1342,7 +1342,7 @@
           <a:p>
             <a:fld id="{5CCE303C-61B3-6B4B-86C2-B0455BB704B3}" type="datetimeFigureOut">
               <a:rPr lang="en-US" smtClean="0"/>
-              <a:t>5/22/18</a:t>
+              <a:t>6/4/18</a:t>
             </a:fld>
             <a:endParaRPr lang="en-US"/>
           </a:p>
@@ -1764,7 +1764,7 @@
           <a:p>
             <a:fld id="{5CCE303C-61B3-6B4B-86C2-B0455BB704B3}" type="datetimeFigureOut">
               <a:rPr lang="en-US" smtClean="0"/>
-              <a:t>5/22/18</a:t>
+              <a:t>6/4/18</a:t>
             </a:fld>
             <a:endParaRPr lang="en-US"/>
           </a:p>
@@ -1882,7 +1882,7 @@
           <a:p>
             <a:fld id="{5CCE303C-61B3-6B4B-86C2-B0455BB704B3}" type="datetimeFigureOut">
               <a:rPr lang="en-US" smtClean="0"/>
-              <a:t>5/22/18</a:t>
+              <a:t>6/4/18</a:t>
             </a:fld>
             <a:endParaRPr lang="en-US"/>
           </a:p>
@@ -1977,7 +1977,7 @@
           <a:p>
             <a:fld id="{5CCE303C-61B3-6B4B-86C2-B0455BB704B3}" type="datetimeFigureOut">
               <a:rPr lang="en-US" smtClean="0"/>
-              <a:t>5/22/18</a:t>
+              <a:t>6/4/18</a:t>
             </a:fld>
             <a:endParaRPr lang="en-US"/>
           </a:p>
@@ -2254,7 +2254,7 @@
           <a:p>
             <a:fld id="{5CCE303C-61B3-6B4B-86C2-B0455BB704B3}" type="datetimeFigureOut">
               <a:rPr lang="en-US" smtClean="0"/>
-              <a:t>5/22/18</a:t>
+              <a:t>6/4/18</a:t>
             </a:fld>
             <a:endParaRPr lang="en-US"/>
           </a:p>
@@ -2507,7 +2507,7 @@
           <a:p>
             <a:fld id="{5CCE303C-61B3-6B4B-86C2-B0455BB704B3}" type="datetimeFigureOut">
               <a:rPr lang="en-US" smtClean="0"/>
-              <a:t>5/22/18</a:t>
+              <a:t>6/4/18</a:t>
             </a:fld>
             <a:endParaRPr lang="en-US"/>
           </a:p>
@@ -2720,7 +2720,7 @@
           <a:p>
             <a:fld id="{5CCE303C-61B3-6B4B-86C2-B0455BB704B3}" type="datetimeFigureOut">
               <a:rPr lang="en-US" smtClean="0"/>
-              <a:t>5/22/18</a:t>
+              <a:t>6/4/18</a:t>
             </a:fld>
             <a:endParaRPr lang="en-US"/>
           </a:p>
@@ -3679,8 +3679,8 @@
         </p:nvSpPr>
         <p:spPr>
           <a:xfrm>
-            <a:off x="31811" y="1265339"/>
-            <a:ext cx="877163" cy="461665"/>
+            <a:off x="44635" y="1265339"/>
+            <a:ext cx="851515" cy="461665"/>
           </a:xfrm>
           <a:prstGeom prst="rect">
             <a:avLst/>
@@ -3703,12 +3703,13 @@
             <a:pPr algn="ctr"/>
             <a:r>
               <a:rPr lang="en-US" sz="800" dirty="0" smtClean="0"/>
-              <a:t>pKa  </a:t>
-            </a:r>
-            <a:r>
-              <a:rPr lang="en-US" sz="800" dirty="0" smtClean="0"/>
-              <a:t>9.53 ±  0.01</a:t>
-            </a:r>
+              <a:t>pKa  9.53 </a:t>
+            </a:r>
+            <a:r>
+              <a:rPr lang="en-US" sz="800" dirty="0" smtClean="0"/>
+              <a:t>± 0.01</a:t>
+            </a:r>
+            <a:endParaRPr lang="en-US" sz="800" dirty="0" smtClean="0"/>
           </a:p>
           <a:p>
             <a:pPr algn="ctr"/>
@@ -3724,8 +3725,8 @@
         </p:nvSpPr>
         <p:spPr>
           <a:xfrm>
-            <a:off x="1135787" y="1265339"/>
-            <a:ext cx="877163" cy="461665"/>
+            <a:off x="1148611" y="1265339"/>
+            <a:ext cx="851515" cy="461665"/>
           </a:xfrm>
           <a:prstGeom prst="rect">
             <a:avLst/>
@@ -3748,12 +3749,13 @@
             <a:pPr algn="ctr"/>
             <a:r>
               <a:rPr lang="en-US" sz="800" dirty="0" smtClean="0"/>
-              <a:t>pKa  </a:t>
-            </a:r>
-            <a:r>
-              <a:rPr lang="en-US" sz="800" dirty="0" smtClean="0"/>
-              <a:t>5.03 ±  0.01</a:t>
-            </a:r>
+              <a:t>pKa  5.03 </a:t>
+            </a:r>
+            <a:r>
+              <a:rPr lang="en-US" sz="800" dirty="0" smtClean="0"/>
+              <a:t>± 0.01</a:t>
+            </a:r>
+            <a:endParaRPr lang="en-US" sz="800" dirty="0" smtClean="0"/>
           </a:p>
           <a:p>
             <a:pPr algn="ctr"/>
@@ -3793,12 +3795,13 @@
             <a:pPr algn="ctr"/>
             <a:r>
               <a:rPr lang="en-US" sz="800" dirty="0" smtClean="0"/>
-              <a:t>pKa  </a:t>
-            </a:r>
-            <a:r>
-              <a:rPr lang="en-US" sz="800" dirty="0" smtClean="0"/>
-              <a:t>7.02 ±  0.01</a:t>
-            </a:r>
+              <a:t>pKa  7.02 ± </a:t>
+            </a:r>
+            <a:r>
+              <a:rPr lang="en-US" sz="800" dirty="0" smtClean="0"/>
+              <a:t>0.01</a:t>
+            </a:r>
+            <a:endParaRPr lang="en-US" sz="800" dirty="0" smtClean="0"/>
           </a:p>
           <a:p>
             <a:pPr algn="ctr"/>
@@ -3838,12 +3841,13 @@
             <a:pPr algn="ctr"/>
             <a:r>
               <a:rPr lang="en-US" sz="800" dirty="0" smtClean="0"/>
-              <a:t>pKa  </a:t>
-            </a:r>
-            <a:r>
-              <a:rPr lang="en-US" sz="800" dirty="0" smtClean="0"/>
-              <a:t>6.02 ±  0.01</a:t>
-            </a:r>
+              <a:t>pKa  6.02 ± </a:t>
+            </a:r>
+            <a:r>
+              <a:rPr lang="en-US" sz="800" dirty="0" smtClean="0"/>
+              <a:t>0.01</a:t>
+            </a:r>
+            <a:endParaRPr lang="en-US" sz="800" dirty="0" smtClean="0"/>
           </a:p>
           <a:p>
             <a:pPr algn="ctr"/>
@@ -3883,12 +3887,13 @@
             <a:pPr algn="ctr"/>
             <a:r>
               <a:rPr lang="en-US" sz="800" dirty="0" smtClean="0"/>
-              <a:t>pKa  </a:t>
-            </a:r>
-            <a:r>
-              <a:rPr lang="en-US" sz="800" dirty="0" smtClean="0"/>
-              <a:t>4.59 ±  0.01</a:t>
-            </a:r>
+              <a:t>pKa  4.59 ± </a:t>
+            </a:r>
+            <a:r>
+              <a:rPr lang="en-US" sz="800" dirty="0" smtClean="0"/>
+              <a:t>0.01</a:t>
+            </a:r>
+            <a:endParaRPr lang="en-US" sz="800" dirty="0" smtClean="0"/>
           </a:p>
           <a:p>
             <a:pPr algn="ctr"/>
@@ -3936,8 +3941,13 @@
             </a:r>
             <a:r>
               <a:rPr lang="en-US" sz="800" dirty="0" smtClean="0"/>
-              <a:t>   3.03 ±  0.04</a:t>
-            </a:r>
+              <a:t>   3.03 ± </a:t>
+            </a:r>
+            <a:r>
+              <a:rPr lang="en-US" sz="800" dirty="0" smtClean="0"/>
+              <a:t>0.04</a:t>
+            </a:r>
+            <a:endParaRPr lang="en-US" sz="800" dirty="0" smtClean="0"/>
           </a:p>
           <a:p>
             <a:pPr algn="ctr"/>
@@ -3951,8 +3961,13 @@
             </a:r>
             <a:r>
               <a:rPr lang="en-US" sz="800" dirty="0" smtClean="0"/>
-              <a:t>  11.74 ±  0.01</a:t>
-            </a:r>
+              <a:t>  11.74 ± </a:t>
+            </a:r>
+            <a:r>
+              <a:rPr lang="en-US" sz="800" dirty="0" smtClean="0"/>
+              <a:t>0.01</a:t>
+            </a:r>
+            <a:endParaRPr lang="en-US" sz="800" dirty="0" smtClean="0"/>
           </a:p>
           <a:p>
             <a:pPr algn="ctr"/>
@@ -3995,13 +4010,26 @@
           <a:p>
             <a:pPr algn="ctr"/>
             <a:r>
-              <a:rPr lang="en-US" sz="800" dirty="0" smtClean="0"/>
-              <a:t>pKa   </a:t>
-            </a:r>
-            <a:r>
-              <a:rPr lang="en-US" sz="800" dirty="0" smtClean="0"/>
-              <a:t>6.08 ±  0.01</a:t>
-            </a:r>
+              <a:rPr lang="en-US" sz="800" dirty="0" err="1" smtClean="0"/>
+              <a:t>pKa</a:t>
+            </a:r>
+            <a:r>
+              <a:rPr lang="en-US" sz="800" dirty="0" smtClean="0"/>
+              <a:t>  </a:t>
+            </a:r>
+            <a:r>
+              <a:rPr lang="en-US" sz="800" dirty="0" smtClean="0"/>
+              <a:t> 6.08 </a:t>
+            </a:r>
+            <a:r>
+              <a:rPr lang="en-US" sz="800" dirty="0" smtClean="0"/>
+              <a:t>± </a:t>
+            </a:r>
+            <a:r>
+              <a:rPr lang="en-US" sz="800" dirty="0" smtClean="0"/>
+              <a:t>0.01</a:t>
+            </a:r>
+            <a:endParaRPr lang="en-US" sz="800" dirty="0" smtClean="0"/>
           </a:p>
           <a:p>
             <a:pPr algn="ctr"/>
@@ -4021,8 +4049,8 @@
         </p:nvSpPr>
         <p:spPr>
           <a:xfrm>
-            <a:off x="1447237" y="3175602"/>
-            <a:ext cx="877163" cy="584776"/>
+            <a:off x="1438295" y="3175602"/>
+            <a:ext cx="895047" cy="584776"/>
           </a:xfrm>
           <a:prstGeom prst="rect">
             <a:avLst/>
@@ -4044,13 +4072,18 @@
           <a:p>
             <a:pPr algn="ctr"/>
             <a:r>
-              <a:rPr lang="en-US" sz="800" dirty="0" smtClean="0"/>
-              <a:t>pKa   </a:t>
-            </a:r>
-            <a:r>
-              <a:rPr lang="en-US" sz="800" dirty="0" smtClean="0"/>
-              <a:t>4.22±  0.01</a:t>
-            </a:r>
+              <a:rPr lang="en-US" sz="800" dirty="0" err="1" smtClean="0"/>
+              <a:t>pKa</a:t>
+            </a:r>
+            <a:r>
+              <a:rPr lang="en-US" sz="800" dirty="0" smtClean="0"/>
+              <a:t>   </a:t>
+            </a:r>
+            <a:r>
+              <a:rPr lang="en-US" sz="800" dirty="0" smtClean="0"/>
+              <a:t>4.22 ± 0.01</a:t>
+            </a:r>
+            <a:endParaRPr lang="en-US" sz="800" dirty="0" smtClean="0"/>
           </a:p>
           <a:p>
             <a:pPr algn="ctr"/>
@@ -4094,12 +4127,13 @@
             <a:pPr algn="ctr"/>
             <a:r>
               <a:rPr lang="en-US" sz="800" dirty="0" smtClean="0"/>
-              <a:t>pKa   </a:t>
-            </a:r>
-            <a:r>
-              <a:rPr lang="en-US" sz="800" dirty="0" smtClean="0"/>
-              <a:t>5.37 ±  0.01</a:t>
-            </a:r>
+              <a:t>pKa   5.37 ± </a:t>
+            </a:r>
+            <a:r>
+              <a:rPr lang="en-US" sz="800" dirty="0" smtClean="0"/>
+              <a:t>0.01</a:t>
+            </a:r>
+            <a:endParaRPr lang="en-US" sz="800" dirty="0" smtClean="0"/>
           </a:p>
         </p:txBody>
       </p:sp>
@@ -4135,12 +4169,13 @@
             <a:pPr algn="ctr"/>
             <a:r>
               <a:rPr lang="en-US" sz="800" dirty="0" smtClean="0"/>
-              <a:t>pKa   </a:t>
-            </a:r>
-            <a:r>
-              <a:rPr lang="en-US" sz="800" dirty="0" smtClean="0"/>
-              <a:t>9.02 ±  0.01</a:t>
-            </a:r>
+              <a:t>pKa   9.02 ± </a:t>
+            </a:r>
+            <a:r>
+              <a:rPr lang="en-US" sz="800" dirty="0" smtClean="0"/>
+              <a:t>0.01</a:t>
+            </a:r>
+            <a:endParaRPr lang="en-US" sz="800" dirty="0" smtClean="0"/>
           </a:p>
         </p:txBody>
       </p:sp>
@@ -4176,12 +4211,13 @@
             <a:pPr algn="ctr"/>
             <a:r>
               <a:rPr lang="en-US" sz="800" dirty="0" smtClean="0"/>
-              <a:t>pKa   </a:t>
-            </a:r>
-            <a:r>
-              <a:rPr lang="en-US" sz="800" dirty="0" smtClean="0"/>
-              <a:t>3.89 ±  0.01</a:t>
-            </a:r>
+              <a:t>pKa   3.89 ± </a:t>
+            </a:r>
+            <a:r>
+              <a:rPr lang="en-US" sz="800" dirty="0" smtClean="0"/>
+              <a:t>0.01</a:t>
+            </a:r>
+            <a:endParaRPr lang="en-US" sz="800" dirty="0" smtClean="0"/>
           </a:p>
         </p:txBody>
       </p:sp>
@@ -4217,11 +4253,15 @@
             <a:pPr algn="ctr"/>
             <a:r>
               <a:rPr lang="en-US" sz="800" dirty="0" smtClean="0"/>
-              <a:t>pKa   </a:t>
-            </a:r>
-            <a:r>
-              <a:rPr lang="en-US" sz="800" dirty="0" smtClean="0"/>
-              <a:t>5.28 ±  0.01</a:t>
+              <a:t>pKa   5.28 </a:t>
+            </a:r>
+            <a:r>
+              <a:rPr lang="en-US" sz="800" dirty="0" smtClean="0"/>
+              <a:t>± </a:t>
+            </a:r>
+            <a:r>
+              <a:rPr lang="en-US" sz="800" dirty="0" smtClean="0"/>
+              <a:t>0.01</a:t>
             </a:r>
           </a:p>
         </p:txBody>
@@ -4258,12 +4298,13 @@
             <a:pPr algn="ctr"/>
             <a:r>
               <a:rPr lang="en-US" sz="800" dirty="0" smtClean="0"/>
-              <a:t>pKa   </a:t>
-            </a:r>
-            <a:r>
-              <a:rPr lang="en-US" sz="800" dirty="0" smtClean="0"/>
-              <a:t>5.77 ±  0.01</a:t>
-            </a:r>
+              <a:t>pKa   5.77 ± </a:t>
+            </a:r>
+            <a:r>
+              <a:rPr lang="en-US" sz="800" dirty="0" smtClean="0"/>
+              <a:t>0.01</a:t>
+            </a:r>
+            <a:endParaRPr lang="en-US" sz="800" dirty="0" smtClean="0"/>
           </a:p>
         </p:txBody>
       </p:sp>
@@ -4307,11 +4348,15 @@
             </a:r>
             <a:r>
               <a:rPr lang="en-US" sz="800" dirty="0" smtClean="0"/>
-              <a:t>   </a:t>
-            </a:r>
-            <a:r>
-              <a:rPr lang="en-US" sz="800" dirty="0" smtClean="0"/>
-              <a:t>2.58 ±  0.01</a:t>
+              <a:t>   2.58 </a:t>
+            </a:r>
+            <a:r>
+              <a:rPr lang="en-US" sz="800" dirty="0" smtClean="0"/>
+              <a:t>± </a:t>
+            </a:r>
+            <a:r>
+              <a:rPr lang="en-US" sz="800" dirty="0" smtClean="0"/>
+              <a:t>0.01</a:t>
             </a:r>
           </a:p>
           <a:p>
@@ -4326,11 +4371,15 @@
             </a:r>
             <a:r>
               <a:rPr lang="en-US" sz="800" dirty="0" smtClean="0"/>
-              <a:t>   </a:t>
-            </a:r>
-            <a:r>
-              <a:rPr lang="en-US" sz="800" dirty="0" smtClean="0"/>
-              <a:t>5.30 ±  0.01</a:t>
+              <a:t>   5.30 </a:t>
+            </a:r>
+            <a:r>
+              <a:rPr lang="en-US" sz="800" dirty="0" smtClean="0"/>
+              <a:t>± </a:t>
+            </a:r>
+            <a:r>
+              <a:rPr lang="en-US" sz="800" dirty="0" smtClean="0"/>
+              <a:t>0.01</a:t>
             </a:r>
           </a:p>
           <a:p>
@@ -4347,8 +4396,8 @@
         </p:nvSpPr>
         <p:spPr>
           <a:xfrm>
-            <a:off x="3492922" y="5234034"/>
-            <a:ext cx="954107" cy="584776"/>
+            <a:off x="3516716" y="5234034"/>
+            <a:ext cx="906518" cy="584776"/>
           </a:xfrm>
           <a:prstGeom prst="rect">
             <a:avLst/>
@@ -4379,14 +4428,19 @@
             </a:r>
             <a:r>
               <a:rPr lang="en-US" sz="800" dirty="0" smtClean="0"/>
-              <a:t>   4.70±  0.01</a:t>
-            </a:r>
-          </a:p>
-          <a:p>
-            <a:pPr algn="ctr"/>
-            <a:r>
-              <a:rPr lang="en-US" sz="800" dirty="0" smtClean="0"/>
-              <a:t> pKa</a:t>
+              <a:t>   </a:t>
+            </a:r>
+            <a:r>
+              <a:rPr lang="en-US" sz="800" dirty="0" smtClean="0"/>
+              <a:t>4.70 ± 0.01</a:t>
+            </a:r>
+            <a:endParaRPr lang="en-US" sz="800" dirty="0" smtClean="0"/>
+          </a:p>
+          <a:p>
+            <a:pPr algn="ctr"/>
+            <a:r>
+              <a:rPr lang="en-US" sz="800" dirty="0" smtClean="0"/>
+              <a:t>pKa</a:t>
             </a:r>
             <a:r>
               <a:rPr lang="en-US" sz="800" baseline="-25000" dirty="0" smtClean="0"/>
@@ -4394,7 +4448,19 @@
             </a:r>
             <a:r>
               <a:rPr lang="en-US" sz="800" dirty="0" smtClean="0"/>
-              <a:t>   8.94 ±  0.01</a:t>
+              <a:t>   </a:t>
+            </a:r>
+            <a:r>
+              <a:rPr lang="en-US" sz="800" dirty="0" smtClean="0"/>
+              <a:t>8.94 </a:t>
+            </a:r>
+            <a:r>
+              <a:rPr lang="en-US" sz="800" dirty="0" smtClean="0"/>
+              <a:t>± </a:t>
+            </a:r>
+            <a:r>
+              <a:rPr lang="en-US" sz="800" dirty="0" smtClean="0"/>
+              <a:t>0.01</a:t>
             </a:r>
           </a:p>
           <a:p>
@@ -4411,8 +4477,8 @@
         </p:nvSpPr>
         <p:spPr>
           <a:xfrm>
-            <a:off x="4624890" y="5234034"/>
-            <a:ext cx="1074483" cy="584776"/>
+            <a:off x="4646606" y="5234034"/>
+            <a:ext cx="1031051" cy="584776"/>
           </a:xfrm>
           <a:prstGeom prst="rect">
             <a:avLst/>
@@ -4443,14 +4509,23 @@
             </a:r>
             <a:r>
               <a:rPr lang="en-US" sz="800" dirty="0" smtClean="0"/>
-              <a:t>   5.37±  0.01</a:t>
-            </a:r>
-          </a:p>
-          <a:p>
-            <a:pPr algn="ctr"/>
-            <a:r>
-              <a:rPr lang="en-US" sz="800" dirty="0" smtClean="0"/>
-              <a:t>    pKa</a:t>
+              <a:t>   </a:t>
+            </a:r>
+            <a:r>
+              <a:rPr lang="en-US" sz="800" dirty="0" smtClean="0"/>
+              <a:t>5.37 ± 0.01</a:t>
+            </a:r>
+            <a:endParaRPr lang="en-US" sz="800" dirty="0" smtClean="0"/>
+          </a:p>
+          <a:p>
+            <a:pPr algn="ctr"/>
+            <a:r>
+              <a:rPr lang="en-US" sz="800" dirty="0" smtClean="0"/>
+              <a:t>   </a:t>
+            </a:r>
+            <a:r>
+              <a:rPr lang="en-US" sz="800" dirty="0" smtClean="0"/>
+              <a:t>pKa</a:t>
             </a:r>
             <a:r>
               <a:rPr lang="en-US" sz="800" baseline="-25000" dirty="0" smtClean="0"/>
@@ -4458,8 +4533,9 @@
             </a:r>
             <a:r>
               <a:rPr lang="en-US" sz="800" dirty="0" smtClean="0"/>
-              <a:t>   10.65 ±  0.01</a:t>
-            </a:r>
+              <a:t>   10.65 ± 0.01</a:t>
+            </a:r>
+            <a:endParaRPr lang="en-US" sz="800" dirty="0" smtClean="0"/>
           </a:p>
           <a:p>
             <a:pPr algn="ctr"/>
@@ -4507,11 +4583,15 @@
             </a:r>
             <a:r>
               <a:rPr lang="en-US" sz="800" dirty="0" smtClean="0"/>
-              <a:t>  </a:t>
-            </a:r>
-            <a:r>
-              <a:rPr lang="en-US" sz="800" dirty="0" smtClean="0"/>
-              <a:t>3.16 ±  0.01</a:t>
+              <a:t>  3.16 </a:t>
+            </a:r>
+            <a:r>
+              <a:rPr lang="en-US" sz="800" dirty="0" smtClean="0"/>
+              <a:t>± </a:t>
+            </a:r>
+            <a:r>
+              <a:rPr lang="en-US" sz="800" dirty="0" smtClean="0"/>
+              <a:t>0.01</a:t>
             </a:r>
           </a:p>
           <a:p>
@@ -4528,8 +4608,8 @@
         </p:nvSpPr>
         <p:spPr>
           <a:xfrm>
-            <a:off x="863107" y="6786557"/>
-            <a:ext cx="1056700" cy="954107"/>
+            <a:off x="888755" y="6786557"/>
+            <a:ext cx="1005403" cy="954107"/>
           </a:xfrm>
           <a:prstGeom prst="rect">
             <a:avLst/>
@@ -4560,7 +4640,7 @@
             </a:r>
             <a:r>
               <a:rPr lang="en-US" sz="800" dirty="0" smtClean="0"/>
-              <a:t>   2.15 ±  0.02</a:t>
+              <a:t>   2.15 ± 0.02</a:t>
             </a:r>
           </a:p>
           <a:p>
@@ -4570,12 +4650,24 @@
               <a:t>pKa</a:t>
             </a:r>
             <a:r>
-              <a:rPr lang="en-US" sz="800" baseline="-25000" dirty="0"/>
+              <a:rPr lang="en-US" sz="800" baseline="-25000" dirty="0" smtClean="0"/>
               <a:t>2</a:t>
             </a:r>
             <a:r>
               <a:rPr lang="en-US" sz="800" dirty="0" smtClean="0"/>
-              <a:t>   9.58 ±  0.03</a:t>
+              <a:t>   </a:t>
+            </a:r>
+            <a:r>
+              <a:rPr lang="en-US" sz="800" dirty="0" smtClean="0"/>
+              <a:t>9.58 </a:t>
+            </a:r>
+            <a:r>
+              <a:rPr lang="en-US" sz="800" dirty="0" smtClean="0"/>
+              <a:t>± </a:t>
+            </a:r>
+            <a:r>
+              <a:rPr lang="en-US" sz="800" dirty="0" smtClean="0"/>
+              <a:t>0.03</a:t>
             </a:r>
           </a:p>
           <a:p>
@@ -4590,7 +4682,15 @@
             </a:r>
             <a:r>
               <a:rPr lang="en-US" sz="800" dirty="0" smtClean="0"/>
-              <a:t>   11.02 ±  0.04</a:t>
+              <a:t>   11.02 </a:t>
+            </a:r>
+            <a:r>
+              <a:rPr lang="en-US" sz="800" dirty="0" smtClean="0"/>
+              <a:t>± </a:t>
+            </a:r>
+            <a:r>
+              <a:rPr lang="en-US" sz="800" dirty="0" smtClean="0"/>
+              <a:t>0.04</a:t>
             </a:r>
           </a:p>
           <a:p>
@@ -4639,11 +4739,15 @@
             <a:pPr algn="ctr"/>
             <a:r>
               <a:rPr lang="en-US" sz="800" dirty="0" smtClean="0"/>
-              <a:t>pKa   </a:t>
-            </a:r>
-            <a:r>
-              <a:rPr lang="en-US" sz="800" dirty="0" smtClean="0"/>
-              <a:t>9.56 ±  0.02</a:t>
+              <a:t>pKa   9.56 </a:t>
+            </a:r>
+            <a:r>
+              <a:rPr lang="en-US" sz="800" dirty="0" smtClean="0"/>
+              <a:t>± </a:t>
+            </a:r>
+            <a:r>
+              <a:rPr lang="en-US" sz="800" dirty="0" smtClean="0"/>
+              <a:t>0.02</a:t>
             </a:r>
           </a:p>
           <a:p>
@@ -4684,11 +4788,15 @@
             <a:pPr algn="ctr"/>
             <a:r>
               <a:rPr lang="en-US" sz="800" dirty="0" smtClean="0"/>
-              <a:t>pKa   </a:t>
-            </a:r>
-            <a:r>
-              <a:rPr lang="en-US" sz="800" dirty="0" smtClean="0"/>
-              <a:t>5.70 ±  0.03</a:t>
+              <a:t>pKa   5.70 </a:t>
+            </a:r>
+            <a:r>
+              <a:rPr lang="en-US" sz="800" dirty="0" smtClean="0"/>
+              <a:t>± </a:t>
+            </a:r>
+            <a:r>
+              <a:rPr lang="en-US" sz="800" dirty="0" smtClean="0"/>
+              <a:t>0.03</a:t>
             </a:r>
           </a:p>
           <a:p>
@@ -4729,12 +4837,13 @@
             <a:pPr algn="ctr"/>
             <a:r>
               <a:rPr lang="en-US" sz="800" dirty="0" smtClean="0"/>
-              <a:t>pKa   </a:t>
-            </a:r>
-            <a:r>
-              <a:rPr lang="en-US" sz="800" dirty="0" smtClean="0"/>
-              <a:t>4.10 ±  0.01</a:t>
-            </a:r>
+              <a:t>pKa   4.10 ± </a:t>
+            </a:r>
+            <a:r>
+              <a:rPr lang="en-US" sz="800" dirty="0" smtClean="0"/>
+              <a:t>0.01</a:t>
+            </a:r>
+            <a:endParaRPr lang="en-US" sz="800" dirty="0" smtClean="0"/>
           </a:p>
           <a:p>
             <a:pPr algn="ctr"/>
@@ -4782,7 +4891,15 @@
             </a:r>
             <a:r>
               <a:rPr lang="en-US" sz="800" dirty="0" smtClean="0"/>
-              <a:t>   2.40 ±  0.02</a:t>
+              <a:t>   2.40 </a:t>
+            </a:r>
+            <a:r>
+              <a:rPr lang="en-US" sz="800" dirty="0" smtClean="0"/>
+              <a:t>± </a:t>
+            </a:r>
+            <a:r>
+              <a:rPr lang="en-US" sz="800" dirty="0" smtClean="0"/>
+              <a:t>0.02</a:t>
             </a:r>
           </a:p>
           <a:p>
@@ -4797,8 +4914,13 @@
             </a:r>
             <a:r>
               <a:rPr lang="en-US" sz="800" dirty="0" smtClean="0"/>
-              <a:t>   7.43 ±  0.01</a:t>
-            </a:r>
+              <a:t>   7.43 ± </a:t>
+            </a:r>
+            <a:r>
+              <a:rPr lang="en-US" sz="800" dirty="0" smtClean="0"/>
+              <a:t>0.01</a:t>
+            </a:r>
+            <a:endParaRPr lang="en-US" sz="800" dirty="0" smtClean="0"/>
           </a:p>
           <a:p>
             <a:pPr algn="ctr"/>
@@ -4842,12 +4964,13 @@
             <a:pPr algn="ctr"/>
             <a:r>
               <a:rPr lang="en-US" sz="800" dirty="0" smtClean="0"/>
-              <a:t>pKa   </a:t>
-            </a:r>
-            <a:r>
-              <a:rPr lang="en-US" sz="800" dirty="0" smtClean="0"/>
-              <a:t>5.45 ±  0.01</a:t>
-            </a:r>
+              <a:t>pKa   5.45 ± </a:t>
+            </a:r>
+            <a:r>
+              <a:rPr lang="en-US" sz="800" dirty="0" smtClean="0"/>
+              <a:t>0.01</a:t>
+            </a:r>
+            <a:endParaRPr lang="en-US" sz="800" dirty="0" smtClean="0"/>
           </a:p>
           <a:p>
             <a:pPr algn="ctr"/>
@@ -4891,11 +5014,15 @@
             <a:pPr algn="ctr"/>
             <a:r>
               <a:rPr lang="en-US" sz="800" dirty="0" smtClean="0"/>
-              <a:t>pKa   </a:t>
-            </a:r>
-            <a:r>
-              <a:rPr lang="en-US" sz="800" dirty="0" smtClean="0"/>
-              <a:t>2.60 ±  0.01</a:t>
+              <a:t>pKa   2.60 </a:t>
+            </a:r>
+            <a:r>
+              <a:rPr lang="en-US" sz="800" dirty="0" smtClean="0"/>
+              <a:t>± </a:t>
+            </a:r>
+            <a:r>
+              <a:rPr lang="en-US" sz="800" dirty="0" smtClean="0"/>
+              <a:t>0.01</a:t>
             </a:r>
           </a:p>
           <a:p>

</xml_diff>

<commit_message>
Update figures and SI with new pKa notation.
</commit_message>
<xml_diff>
--- a/figures/chemical_structures_figure/SAMPL6_pKa_molecules_fig.pptx
+++ b/figures/chemical_structures_figure/SAMPL6_pKa_molecules_fig.pptx
@@ -288,7 +288,7 @@
           <a:p>
             <a:fld id="{5CCE303C-61B3-6B4B-86C2-B0455BB704B3}" type="datetimeFigureOut">
               <a:rPr lang="en-US" smtClean="0"/>
-              <a:t>6/4/18</a:t>
+              <a:t>6/7/18</a:t>
             </a:fld>
             <a:endParaRPr lang="en-US"/>
           </a:p>
@@ -458,7 +458,7 @@
           <a:p>
             <a:fld id="{5CCE303C-61B3-6B4B-86C2-B0455BB704B3}" type="datetimeFigureOut">
               <a:rPr lang="en-US" smtClean="0"/>
-              <a:t>6/4/18</a:t>
+              <a:t>6/7/18</a:t>
             </a:fld>
             <a:endParaRPr lang="en-US"/>
           </a:p>
@@ -638,7 +638,7 @@
           <a:p>
             <a:fld id="{5CCE303C-61B3-6B4B-86C2-B0455BB704B3}" type="datetimeFigureOut">
               <a:rPr lang="en-US" smtClean="0"/>
-              <a:t>6/4/18</a:t>
+              <a:t>6/7/18</a:t>
             </a:fld>
             <a:endParaRPr lang="en-US"/>
           </a:p>
@@ -808,7 +808,7 @@
           <a:p>
             <a:fld id="{5CCE303C-61B3-6B4B-86C2-B0455BB704B3}" type="datetimeFigureOut">
               <a:rPr lang="en-US" smtClean="0"/>
-              <a:t>6/4/18</a:t>
+              <a:t>6/7/18</a:t>
             </a:fld>
             <a:endParaRPr lang="en-US"/>
           </a:p>
@@ -1054,7 +1054,7 @@
           <a:p>
             <a:fld id="{5CCE303C-61B3-6B4B-86C2-B0455BB704B3}" type="datetimeFigureOut">
               <a:rPr lang="en-US" smtClean="0"/>
-              <a:t>6/4/18</a:t>
+              <a:t>6/7/18</a:t>
             </a:fld>
             <a:endParaRPr lang="en-US"/>
           </a:p>
@@ -1342,7 +1342,7 @@
           <a:p>
             <a:fld id="{5CCE303C-61B3-6B4B-86C2-B0455BB704B3}" type="datetimeFigureOut">
               <a:rPr lang="en-US" smtClean="0"/>
-              <a:t>6/4/18</a:t>
+              <a:t>6/7/18</a:t>
             </a:fld>
             <a:endParaRPr lang="en-US"/>
           </a:p>
@@ -1764,7 +1764,7 @@
           <a:p>
             <a:fld id="{5CCE303C-61B3-6B4B-86C2-B0455BB704B3}" type="datetimeFigureOut">
               <a:rPr lang="en-US" smtClean="0"/>
-              <a:t>6/4/18</a:t>
+              <a:t>6/7/18</a:t>
             </a:fld>
             <a:endParaRPr lang="en-US"/>
           </a:p>
@@ -1882,7 +1882,7 @@
           <a:p>
             <a:fld id="{5CCE303C-61B3-6B4B-86C2-B0455BB704B3}" type="datetimeFigureOut">
               <a:rPr lang="en-US" smtClean="0"/>
-              <a:t>6/4/18</a:t>
+              <a:t>6/7/18</a:t>
             </a:fld>
             <a:endParaRPr lang="en-US"/>
           </a:p>
@@ -1977,7 +1977,7 @@
           <a:p>
             <a:fld id="{5CCE303C-61B3-6B4B-86C2-B0455BB704B3}" type="datetimeFigureOut">
               <a:rPr lang="en-US" smtClean="0"/>
-              <a:t>6/4/18</a:t>
+              <a:t>6/7/18</a:t>
             </a:fld>
             <a:endParaRPr lang="en-US"/>
           </a:p>
@@ -2254,7 +2254,7 @@
           <a:p>
             <a:fld id="{5CCE303C-61B3-6B4B-86C2-B0455BB704B3}" type="datetimeFigureOut">
               <a:rPr lang="en-US" smtClean="0"/>
-              <a:t>6/4/18</a:t>
+              <a:t>6/7/18</a:t>
             </a:fld>
             <a:endParaRPr lang="en-US"/>
           </a:p>
@@ -2507,7 +2507,7 @@
           <a:p>
             <a:fld id="{5CCE303C-61B3-6B4B-86C2-B0455BB704B3}" type="datetimeFigureOut">
               <a:rPr lang="en-US" smtClean="0"/>
-              <a:t>6/4/18</a:t>
+              <a:t>6/7/18</a:t>
             </a:fld>
             <a:endParaRPr lang="en-US"/>
           </a:p>
@@ -2720,7 +2720,7 @@
           <a:p>
             <a:fld id="{5CCE303C-61B3-6B4B-86C2-B0455BB704B3}" type="datetimeFigureOut">
               <a:rPr lang="en-US" smtClean="0"/>
-              <a:t>6/4/18</a:t>
+              <a:t>6/7/18</a:t>
             </a:fld>
             <a:endParaRPr lang="en-US"/>
           </a:p>
@@ -3703,13 +3703,8 @@
             <a:pPr algn="ctr"/>
             <a:r>
               <a:rPr lang="en-US" sz="800" dirty="0" smtClean="0"/>
-              <a:t>pKa  9.53 </a:t>
-            </a:r>
-            <a:r>
-              <a:rPr lang="en-US" sz="800" dirty="0" smtClean="0"/>
-              <a:t>± 0.01</a:t>
-            </a:r>
-            <a:endParaRPr lang="en-US" sz="800" dirty="0" smtClean="0"/>
+              <a:t>pKa  9.53 ± 0.01</a:t>
+            </a:r>
           </a:p>
           <a:p>
             <a:pPr algn="ctr"/>
@@ -3749,13 +3744,8 @@
             <a:pPr algn="ctr"/>
             <a:r>
               <a:rPr lang="en-US" sz="800" dirty="0" smtClean="0"/>
-              <a:t>pKa  5.03 </a:t>
-            </a:r>
-            <a:r>
-              <a:rPr lang="en-US" sz="800" dirty="0" smtClean="0"/>
-              <a:t>± 0.01</a:t>
-            </a:r>
-            <a:endParaRPr lang="en-US" sz="800" dirty="0" smtClean="0"/>
+              <a:t>pKa  5.03 ± 0.01</a:t>
+            </a:r>
           </a:p>
           <a:p>
             <a:pPr algn="ctr"/>
@@ -3795,13 +3785,8 @@
             <a:pPr algn="ctr"/>
             <a:r>
               <a:rPr lang="en-US" sz="800" dirty="0" smtClean="0"/>
-              <a:t>pKa  7.02 ± </a:t>
-            </a:r>
-            <a:r>
-              <a:rPr lang="en-US" sz="800" dirty="0" smtClean="0"/>
-              <a:t>0.01</a:t>
-            </a:r>
-            <a:endParaRPr lang="en-US" sz="800" dirty="0" smtClean="0"/>
+              <a:t>pKa  7.02 ± 0.01</a:t>
+            </a:r>
           </a:p>
           <a:p>
             <a:pPr algn="ctr"/>
@@ -3841,13 +3826,8 @@
             <a:pPr algn="ctr"/>
             <a:r>
               <a:rPr lang="en-US" sz="800" dirty="0" smtClean="0"/>
-              <a:t>pKa  6.02 ± </a:t>
-            </a:r>
-            <a:r>
-              <a:rPr lang="en-US" sz="800" dirty="0" smtClean="0"/>
-              <a:t>0.01</a:t>
-            </a:r>
-            <a:endParaRPr lang="en-US" sz="800" dirty="0" smtClean="0"/>
+              <a:t>pKa  6.02 ± 0.01</a:t>
+            </a:r>
           </a:p>
           <a:p>
             <a:pPr algn="ctr"/>
@@ -3887,13 +3867,8 @@
             <a:pPr algn="ctr"/>
             <a:r>
               <a:rPr lang="en-US" sz="800" dirty="0" smtClean="0"/>
-              <a:t>pKa  4.59 ± </a:t>
-            </a:r>
-            <a:r>
-              <a:rPr lang="en-US" sz="800" dirty="0" smtClean="0"/>
-              <a:t>0.01</a:t>
-            </a:r>
-            <a:endParaRPr lang="en-US" sz="800" dirty="0" smtClean="0"/>
+              <a:t>pKa  4.59 ± 0.01</a:t>
+            </a:r>
           </a:p>
           <a:p>
             <a:pPr algn="ctr"/>
@@ -3941,13 +3916,8 @@
             </a:r>
             <a:r>
               <a:rPr lang="en-US" sz="800" dirty="0" smtClean="0"/>
-              <a:t>   3.03 ± </a:t>
-            </a:r>
-            <a:r>
-              <a:rPr lang="en-US" sz="800" dirty="0" smtClean="0"/>
-              <a:t>0.04</a:t>
-            </a:r>
-            <a:endParaRPr lang="en-US" sz="800" dirty="0" smtClean="0"/>
+              <a:t>   3.03 ± 0.04</a:t>
+            </a:r>
           </a:p>
           <a:p>
             <a:pPr algn="ctr"/>
@@ -3961,13 +3931,8 @@
             </a:r>
             <a:r>
               <a:rPr lang="en-US" sz="800" dirty="0" smtClean="0"/>
-              <a:t>  11.74 ± </a:t>
-            </a:r>
-            <a:r>
-              <a:rPr lang="en-US" sz="800" dirty="0" smtClean="0"/>
-              <a:t>0.01</a:t>
-            </a:r>
-            <a:endParaRPr lang="en-US" sz="800" dirty="0" smtClean="0"/>
+              <a:t>  11.74 ± 0.01</a:t>
+            </a:r>
           </a:p>
           <a:p>
             <a:pPr algn="ctr"/>
@@ -3987,8 +3952,8 @@
         </p:nvSpPr>
         <p:spPr>
           <a:xfrm>
-            <a:off x="183954" y="3175602"/>
-            <a:ext cx="895047" cy="584776"/>
+            <a:off x="192896" y="3175602"/>
+            <a:ext cx="877163" cy="584776"/>
           </a:xfrm>
           <a:prstGeom prst="rect">
             <a:avLst/>
@@ -4010,26 +3975,17 @@
           <a:p>
             <a:pPr algn="ctr"/>
             <a:r>
-              <a:rPr lang="en-US" sz="800" dirty="0" err="1" smtClean="0"/>
-              <a:t>pKa</a:t>
-            </a:r>
-            <a:r>
-              <a:rPr lang="en-US" sz="800" dirty="0" smtClean="0"/>
-              <a:t>  </a:t>
-            </a:r>
-            <a:r>
-              <a:rPr lang="en-US" sz="800" dirty="0" smtClean="0"/>
-              <a:t> 6.08 </a:t>
-            </a:r>
-            <a:r>
-              <a:rPr lang="en-US" sz="800" dirty="0" smtClean="0"/>
-              <a:t>± </a:t>
-            </a:r>
-            <a:r>
-              <a:rPr lang="en-US" sz="800" dirty="0" smtClean="0"/>
-              <a:t>0.01</a:t>
-            </a:r>
-            <a:endParaRPr lang="en-US" sz="800" dirty="0" smtClean="0"/>
+              <a:rPr lang="en-US" sz="800" dirty="0" smtClean="0"/>
+              <a:t>pK</a:t>
+            </a:r>
+            <a:r>
+              <a:rPr lang="en-US" sz="1000" baseline="-25000" dirty="0" smtClean="0"/>
+              <a:t>a</a:t>
+            </a:r>
+            <a:r>
+              <a:rPr lang="en-US" sz="800" dirty="0" smtClean="0"/>
+              <a:t>   6.08 ± 0.01</a:t>
+            </a:r>
           </a:p>
           <a:p>
             <a:pPr algn="ctr"/>
@@ -4049,8 +4005,8 @@
         </p:nvSpPr>
         <p:spPr>
           <a:xfrm>
-            <a:off x="1438295" y="3175602"/>
-            <a:ext cx="895047" cy="584776"/>
+            <a:off x="1453649" y="3175602"/>
+            <a:ext cx="864339" cy="584776"/>
           </a:xfrm>
           <a:prstGeom prst="rect">
             <a:avLst/>
@@ -4072,18 +4028,17 @@
           <a:p>
             <a:pPr algn="ctr"/>
             <a:r>
-              <a:rPr lang="en-US" sz="800" dirty="0" err="1" smtClean="0"/>
-              <a:t>pKa</a:t>
-            </a:r>
-            <a:r>
-              <a:rPr lang="en-US" sz="800" dirty="0" smtClean="0"/>
-              <a:t>   </a:t>
-            </a:r>
-            <a:r>
-              <a:rPr lang="en-US" sz="800" dirty="0" smtClean="0"/>
-              <a:t>4.22 ± 0.01</a:t>
-            </a:r>
-            <a:endParaRPr lang="en-US" sz="800" dirty="0" smtClean="0"/>
+              <a:rPr lang="en-US" sz="800" dirty="0" smtClean="0"/>
+              <a:t>pK</a:t>
+            </a:r>
+            <a:r>
+              <a:rPr lang="en-US" sz="1000" baseline="-25000" dirty="0" smtClean="0"/>
+              <a:t>a</a:t>
+            </a:r>
+            <a:r>
+              <a:rPr lang="en-US" sz="800" dirty="0" smtClean="0"/>
+              <a:t>   4.22 ± 0.01</a:t>
+            </a:r>
           </a:p>
           <a:p>
             <a:pPr algn="ctr"/>
@@ -4103,8 +4058,8 @@
         </p:nvSpPr>
         <p:spPr>
           <a:xfrm>
-            <a:off x="2847424" y="3175602"/>
-            <a:ext cx="895047" cy="338554"/>
+            <a:off x="2862778" y="3175602"/>
+            <a:ext cx="864339" cy="338554"/>
           </a:xfrm>
           <a:prstGeom prst="rect">
             <a:avLst/>
@@ -4127,13 +4082,16 @@
             <a:pPr algn="ctr"/>
             <a:r>
               <a:rPr lang="en-US" sz="800" dirty="0" smtClean="0"/>
-              <a:t>pKa   5.37 ± </a:t>
-            </a:r>
-            <a:r>
-              <a:rPr lang="en-US" sz="800" dirty="0" smtClean="0"/>
-              <a:t>0.01</a:t>
-            </a:r>
-            <a:endParaRPr lang="en-US" sz="800" dirty="0" smtClean="0"/>
+              <a:t>pK</a:t>
+            </a:r>
+            <a:r>
+              <a:rPr lang="en-US" sz="1000" baseline="-25000" dirty="0" smtClean="0"/>
+              <a:t>a</a:t>
+            </a:r>
+            <a:r>
+              <a:rPr lang="en-US" sz="800" dirty="0" smtClean="0"/>
+              <a:t>   5.37 ± 0.01</a:t>
+            </a:r>
           </a:p>
         </p:txBody>
       </p:sp>
@@ -4145,8 +4103,8 @@
         </p:nvSpPr>
         <p:spPr>
           <a:xfrm>
-            <a:off x="4362430" y="3175602"/>
-            <a:ext cx="895047" cy="338554"/>
+            <a:off x="4377784" y="3175602"/>
+            <a:ext cx="864339" cy="338554"/>
           </a:xfrm>
           <a:prstGeom prst="rect">
             <a:avLst/>
@@ -4169,13 +4127,16 @@
             <a:pPr algn="ctr"/>
             <a:r>
               <a:rPr lang="en-US" sz="800" dirty="0" smtClean="0"/>
-              <a:t>pKa   9.02 ± </a:t>
-            </a:r>
-            <a:r>
-              <a:rPr lang="en-US" sz="800" dirty="0" smtClean="0"/>
-              <a:t>0.01</a:t>
-            </a:r>
-            <a:endParaRPr lang="en-US" sz="800" dirty="0" smtClean="0"/>
+              <a:t>pK</a:t>
+            </a:r>
+            <a:r>
+              <a:rPr lang="en-US" sz="1000" baseline="-25000" dirty="0" smtClean="0"/>
+              <a:t>a</a:t>
+            </a:r>
+            <a:r>
+              <a:rPr lang="en-US" sz="800" dirty="0" smtClean="0"/>
+              <a:t>   9.02 ± 0.01</a:t>
+            </a:r>
           </a:p>
         </p:txBody>
       </p:sp>
@@ -4187,8 +4148,8 @@
         </p:nvSpPr>
         <p:spPr>
           <a:xfrm>
-            <a:off x="5746367" y="3175602"/>
-            <a:ext cx="895047" cy="338554"/>
+            <a:off x="5761721" y="3175602"/>
+            <a:ext cx="864339" cy="338554"/>
           </a:xfrm>
           <a:prstGeom prst="rect">
             <a:avLst/>
@@ -4211,13 +4172,16 @@
             <a:pPr algn="ctr"/>
             <a:r>
               <a:rPr lang="en-US" sz="800" dirty="0" smtClean="0"/>
-              <a:t>pKa   3.89 ± </a:t>
-            </a:r>
-            <a:r>
-              <a:rPr lang="en-US" sz="800" dirty="0" smtClean="0"/>
-              <a:t>0.01</a:t>
-            </a:r>
-            <a:endParaRPr lang="en-US" sz="800" dirty="0" smtClean="0"/>
+              <a:t>pK</a:t>
+            </a:r>
+            <a:r>
+              <a:rPr lang="en-US" sz="1000" baseline="-25000" dirty="0" smtClean="0"/>
+              <a:t>a</a:t>
+            </a:r>
+            <a:r>
+              <a:rPr lang="en-US" sz="800" dirty="0" smtClean="0"/>
+              <a:t>   3.89 ± 0.01</a:t>
+            </a:r>
           </a:p>
         </p:txBody>
       </p:sp>
@@ -4229,8 +4193,8 @@
         </p:nvSpPr>
         <p:spPr>
           <a:xfrm>
-            <a:off x="76453" y="5234034"/>
-            <a:ext cx="895047" cy="338554"/>
+            <a:off x="91807" y="5234034"/>
+            <a:ext cx="864339" cy="338554"/>
           </a:xfrm>
           <a:prstGeom prst="rect">
             <a:avLst/>
@@ -4253,15 +4217,15 @@
             <a:pPr algn="ctr"/>
             <a:r>
               <a:rPr lang="en-US" sz="800" dirty="0" smtClean="0"/>
-              <a:t>pKa   5.28 </a:t>
-            </a:r>
-            <a:r>
-              <a:rPr lang="en-US" sz="800" dirty="0" smtClean="0"/>
-              <a:t>± </a:t>
-            </a:r>
-            <a:r>
-              <a:rPr lang="en-US" sz="800" dirty="0" smtClean="0"/>
-              <a:t>0.01</a:t>
+              <a:t>pK</a:t>
+            </a:r>
+            <a:r>
+              <a:rPr lang="en-US" sz="1000" baseline="-25000" dirty="0" smtClean="0"/>
+              <a:t>a</a:t>
+            </a:r>
+            <a:r>
+              <a:rPr lang="en-US" sz="800" dirty="0" smtClean="0"/>
+              <a:t>   5.28 ± 0.01</a:t>
             </a:r>
           </a:p>
         </p:txBody>
@@ -4274,8 +4238,8 @@
         </p:nvSpPr>
         <p:spPr>
           <a:xfrm>
-            <a:off x="1234972" y="5234034"/>
-            <a:ext cx="895047" cy="338554"/>
+            <a:off x="1250326" y="5234034"/>
+            <a:ext cx="864339" cy="338554"/>
           </a:xfrm>
           <a:prstGeom prst="rect">
             <a:avLst/>
@@ -4298,13 +4262,16 @@
             <a:pPr algn="ctr"/>
             <a:r>
               <a:rPr lang="en-US" sz="800" dirty="0" smtClean="0"/>
-              <a:t>pKa   5.77 ± </a:t>
-            </a:r>
-            <a:r>
-              <a:rPr lang="en-US" sz="800" dirty="0" smtClean="0"/>
-              <a:t>0.01</a:t>
-            </a:r>
-            <a:endParaRPr lang="en-US" sz="800" dirty="0" smtClean="0"/>
+              <a:t>pK</a:t>
+            </a:r>
+            <a:r>
+              <a:rPr lang="en-US" sz="1000" baseline="-25000" dirty="0" smtClean="0"/>
+              <a:t>a</a:t>
+            </a:r>
+            <a:r>
+              <a:rPr lang="en-US" sz="800" dirty="0" smtClean="0"/>
+              <a:t>   5.77 ± 0.01</a:t>
+            </a:r>
           </a:p>
         </p:txBody>
       </p:sp>
@@ -4340,46 +4307,30 @@
             <a:pPr algn="ctr"/>
             <a:r>
               <a:rPr lang="en-US" sz="800" dirty="0" smtClean="0"/>
-              <a:t>pKa</a:t>
-            </a:r>
-            <a:r>
-              <a:rPr lang="en-US" sz="800" baseline="-25000" dirty="0" smtClean="0"/>
-              <a:t>1</a:t>
-            </a:r>
-            <a:r>
-              <a:rPr lang="en-US" sz="800" dirty="0" smtClean="0"/>
-              <a:t>   2.58 </a:t>
-            </a:r>
-            <a:r>
-              <a:rPr lang="en-US" sz="800" dirty="0" smtClean="0"/>
-              <a:t>± </a:t>
-            </a:r>
-            <a:r>
-              <a:rPr lang="en-US" sz="800" dirty="0" smtClean="0"/>
-              <a:t>0.01</a:t>
-            </a:r>
-          </a:p>
-          <a:p>
-            <a:pPr algn="ctr"/>
-            <a:r>
-              <a:rPr lang="en-US" sz="800" dirty="0" smtClean="0"/>
-              <a:t>pKa</a:t>
-            </a:r>
-            <a:r>
-              <a:rPr lang="en-US" sz="800" baseline="-25000" dirty="0" smtClean="0"/>
-              <a:t>2</a:t>
-            </a:r>
-            <a:r>
-              <a:rPr lang="en-US" sz="800" dirty="0" smtClean="0"/>
-              <a:t>   5.30 </a:t>
-            </a:r>
-            <a:r>
-              <a:rPr lang="en-US" sz="800" dirty="0" smtClean="0"/>
-              <a:t>± </a:t>
-            </a:r>
-            <a:r>
-              <a:rPr lang="en-US" sz="800" dirty="0" smtClean="0"/>
-              <a:t>0.01</a:t>
+              <a:t>pK</a:t>
+            </a:r>
+            <a:r>
+              <a:rPr lang="en-US" sz="1000" baseline="-25000" dirty="0" smtClean="0"/>
+              <a:t>a1</a:t>
+            </a:r>
+            <a:r>
+              <a:rPr lang="en-US" sz="800" dirty="0" smtClean="0"/>
+              <a:t>   2.58 ± 0.01</a:t>
+            </a:r>
+          </a:p>
+          <a:p>
+            <a:pPr algn="ctr"/>
+            <a:r>
+              <a:rPr lang="en-US" sz="800" dirty="0" smtClean="0"/>
+              <a:t>pK</a:t>
+            </a:r>
+            <a:r>
+              <a:rPr lang="en-US" sz="1000" baseline="-25000" dirty="0" smtClean="0"/>
+              <a:t>a2</a:t>
+            </a:r>
+            <a:r>
+              <a:rPr lang="en-US" sz="800" dirty="0" smtClean="0"/>
+              <a:t>   5.30 ± 0.01</a:t>
             </a:r>
           </a:p>
           <a:p>
@@ -4420,47 +4371,30 @@
             <a:pPr algn="ctr"/>
             <a:r>
               <a:rPr lang="en-US" sz="800" dirty="0" smtClean="0"/>
-              <a:t>pKa</a:t>
-            </a:r>
-            <a:r>
-              <a:rPr lang="en-US" sz="800" baseline="-25000" dirty="0" smtClean="0"/>
-              <a:t>1</a:t>
-            </a:r>
-            <a:r>
-              <a:rPr lang="en-US" sz="800" dirty="0" smtClean="0"/>
-              <a:t>   </a:t>
-            </a:r>
-            <a:r>
-              <a:rPr lang="en-US" sz="800" dirty="0" smtClean="0"/>
-              <a:t>4.70 ± 0.01</a:t>
-            </a:r>
-            <a:endParaRPr lang="en-US" sz="800" dirty="0" smtClean="0"/>
-          </a:p>
-          <a:p>
-            <a:pPr algn="ctr"/>
-            <a:r>
-              <a:rPr lang="en-US" sz="800" dirty="0" smtClean="0"/>
-              <a:t>pKa</a:t>
-            </a:r>
-            <a:r>
-              <a:rPr lang="en-US" sz="800" baseline="-25000" dirty="0" smtClean="0"/>
-              <a:t>2</a:t>
-            </a:r>
-            <a:r>
-              <a:rPr lang="en-US" sz="800" dirty="0" smtClean="0"/>
-              <a:t>   </a:t>
-            </a:r>
-            <a:r>
-              <a:rPr lang="en-US" sz="800" dirty="0" smtClean="0"/>
-              <a:t>8.94 </a:t>
-            </a:r>
-            <a:r>
-              <a:rPr lang="en-US" sz="800" dirty="0" smtClean="0"/>
-              <a:t>± </a:t>
-            </a:r>
-            <a:r>
-              <a:rPr lang="en-US" sz="800" dirty="0" smtClean="0"/>
-              <a:t>0.01</a:t>
+              <a:t>pK</a:t>
+            </a:r>
+            <a:r>
+              <a:rPr lang="en-US" sz="1000" baseline="-25000" dirty="0" smtClean="0"/>
+              <a:t>a1</a:t>
+            </a:r>
+            <a:r>
+              <a:rPr lang="en-US" sz="800" dirty="0" smtClean="0"/>
+              <a:t>   4.70 ± 0.01</a:t>
+            </a:r>
+          </a:p>
+          <a:p>
+            <a:pPr algn="ctr"/>
+            <a:r>
+              <a:rPr lang="en-US" sz="800" dirty="0" smtClean="0"/>
+              <a:t>pK</a:t>
+            </a:r>
+            <a:r>
+              <a:rPr lang="en-US" sz="1000" baseline="-25000" dirty="0" smtClean="0"/>
+              <a:t>a2</a:t>
+            </a:r>
+            <a:r>
+              <a:rPr lang="en-US" sz="800" dirty="0" smtClean="0"/>
+              <a:t>   8.94 ± 0.01</a:t>
             </a:r>
           </a:p>
           <a:p>
@@ -4501,41 +4435,31 @@
             <a:pPr algn="ctr"/>
             <a:r>
               <a:rPr lang="en-US" sz="800" dirty="0" smtClean="0"/>
-              <a:t>pKa</a:t>
-            </a:r>
-            <a:r>
-              <a:rPr lang="en-US" sz="800" baseline="-25000" dirty="0" smtClean="0"/>
-              <a:t>1</a:t>
-            </a:r>
-            <a:r>
-              <a:rPr lang="en-US" sz="800" dirty="0" smtClean="0"/>
-              <a:t>   </a:t>
-            </a:r>
-            <a:r>
-              <a:rPr lang="en-US" sz="800" dirty="0" smtClean="0"/>
-              <a:t>5.37 ± 0.01</a:t>
-            </a:r>
-            <a:endParaRPr lang="en-US" sz="800" dirty="0" smtClean="0"/>
-          </a:p>
-          <a:p>
-            <a:pPr algn="ctr"/>
-            <a:r>
-              <a:rPr lang="en-US" sz="800" dirty="0" smtClean="0"/>
-              <a:t>   </a:t>
-            </a:r>
-            <a:r>
-              <a:rPr lang="en-US" sz="800" dirty="0" smtClean="0"/>
-              <a:t>pKa</a:t>
-            </a:r>
-            <a:r>
-              <a:rPr lang="en-US" sz="800" baseline="-25000" dirty="0" smtClean="0"/>
-              <a:t>2</a:t>
+              <a:t>pK</a:t>
+            </a:r>
+            <a:r>
+              <a:rPr lang="en-US" sz="1000" baseline="-25000" dirty="0" smtClean="0"/>
+              <a:t>a1</a:t>
+            </a:r>
+            <a:r>
+              <a:rPr lang="en-US" sz="800" dirty="0" smtClean="0"/>
+              <a:t>   5.37 ± 0.01</a:t>
+            </a:r>
+          </a:p>
+          <a:p>
+            <a:pPr algn="ctr"/>
+            <a:r>
+              <a:rPr lang="en-US" sz="800" dirty="0" smtClean="0"/>
+              <a:t>   pK</a:t>
+            </a:r>
+            <a:r>
+              <a:rPr lang="en-US" sz="1000" baseline="-25000" dirty="0" smtClean="0"/>
+              <a:t>a2</a:t>
             </a:r>
             <a:r>
               <a:rPr lang="en-US" sz="800" dirty="0" smtClean="0"/>
               <a:t>   10.65 ± 0.01</a:t>
             </a:r>
-            <a:endParaRPr lang="en-US" sz="800" dirty="0" smtClean="0"/>
           </a:p>
           <a:p>
             <a:pPr algn="ctr"/>
@@ -4551,8 +4475,8 @@
         </p:nvSpPr>
         <p:spPr>
           <a:xfrm>
-            <a:off x="5819096" y="5234034"/>
-            <a:ext cx="889987" cy="461665"/>
+            <a:off x="5838332" y="5234034"/>
+            <a:ext cx="851515" cy="461665"/>
           </a:xfrm>
           <a:prstGeom prst="rect">
             <a:avLst/>
@@ -4575,7 +4499,11 @@
             <a:pPr algn="ctr"/>
             <a:r>
               <a:rPr lang="en-US" sz="800" dirty="0" smtClean="0"/>
-              <a:t>pKa</a:t>
+              <a:t>pK</a:t>
+            </a:r>
+            <a:r>
+              <a:rPr lang="en-US" sz="1000" baseline="-25000" dirty="0" smtClean="0"/>
+              <a:t>a</a:t>
             </a:r>
             <a:r>
               <a:rPr lang="en-US" sz="800" baseline="-25000" dirty="0"/>
@@ -4583,15 +4511,7 @@
             </a:r>
             <a:r>
               <a:rPr lang="en-US" sz="800" dirty="0" smtClean="0"/>
-              <a:t>  3.16 </a:t>
-            </a:r>
-            <a:r>
-              <a:rPr lang="en-US" sz="800" dirty="0" smtClean="0"/>
-              <a:t>± </a:t>
-            </a:r>
-            <a:r>
-              <a:rPr lang="en-US" sz="800" dirty="0" smtClean="0"/>
-              <a:t>0.01</a:t>
+              <a:t>  3.16 ± 0.01</a:t>
             </a:r>
           </a:p>
           <a:p>
@@ -4608,8 +4528,8 @@
         </p:nvSpPr>
         <p:spPr>
           <a:xfrm>
-            <a:off x="888755" y="6786557"/>
-            <a:ext cx="1005403" cy="954107"/>
+            <a:off x="875931" y="6786557"/>
+            <a:ext cx="1031051" cy="984885"/>
           </a:xfrm>
           <a:prstGeom prst="rect">
             <a:avLst/>
@@ -4632,11 +4552,11 @@
             <a:pPr algn="ctr"/>
             <a:r>
               <a:rPr lang="en-US" sz="800" dirty="0" smtClean="0"/>
-              <a:t>pKa</a:t>
-            </a:r>
-            <a:r>
-              <a:rPr lang="en-US" sz="800" baseline="-25000" dirty="0" smtClean="0"/>
-              <a:t>1</a:t>
+              <a:t>pK</a:t>
+            </a:r>
+            <a:r>
+              <a:rPr lang="en-US" sz="1000" baseline="-25000" dirty="0" smtClean="0"/>
+              <a:t>a1</a:t>
             </a:r>
             <a:r>
               <a:rPr lang="en-US" sz="800" dirty="0" smtClean="0"/>
@@ -4647,50 +4567,30 @@
             <a:pPr algn="ctr"/>
             <a:r>
               <a:rPr lang="en-US" sz="800" dirty="0" smtClean="0"/>
-              <a:t>pKa</a:t>
-            </a:r>
-            <a:r>
-              <a:rPr lang="en-US" sz="800" baseline="-25000" dirty="0" smtClean="0"/>
-              <a:t>2</a:t>
-            </a:r>
-            <a:r>
-              <a:rPr lang="en-US" sz="800" dirty="0" smtClean="0"/>
-              <a:t>   </a:t>
-            </a:r>
-            <a:r>
-              <a:rPr lang="en-US" sz="800" dirty="0" smtClean="0"/>
-              <a:t>9.58 </a:t>
-            </a:r>
-            <a:r>
-              <a:rPr lang="en-US" sz="800" dirty="0" smtClean="0"/>
-              <a:t>± </a:t>
-            </a:r>
-            <a:r>
-              <a:rPr lang="en-US" sz="800" dirty="0" smtClean="0"/>
-              <a:t>0.03</a:t>
-            </a:r>
-          </a:p>
-          <a:p>
-            <a:pPr algn="ctr"/>
-            <a:r>
-              <a:rPr lang="en-US" sz="800" dirty="0" smtClean="0"/>
-              <a:t>  pKa</a:t>
-            </a:r>
-            <a:r>
-              <a:rPr lang="en-US" sz="800" baseline="-25000" dirty="0" smtClean="0"/>
-              <a:t>3</a:t>
-            </a:r>
-            <a:r>
-              <a:rPr lang="en-US" sz="800" dirty="0" smtClean="0"/>
-              <a:t>   11.02 </a:t>
-            </a:r>
-            <a:r>
-              <a:rPr lang="en-US" sz="800" dirty="0" smtClean="0"/>
-              <a:t>± </a:t>
-            </a:r>
-            <a:r>
-              <a:rPr lang="en-US" sz="800" dirty="0" smtClean="0"/>
-              <a:t>0.04</a:t>
+              <a:t>pK</a:t>
+            </a:r>
+            <a:r>
+              <a:rPr lang="en-US" sz="1000" baseline="-25000" dirty="0" smtClean="0"/>
+              <a:t>a2</a:t>
+            </a:r>
+            <a:r>
+              <a:rPr lang="en-US" sz="800" dirty="0" smtClean="0"/>
+              <a:t>   9.58 ± 0.03</a:t>
+            </a:r>
+          </a:p>
+          <a:p>
+            <a:pPr algn="ctr"/>
+            <a:r>
+              <a:rPr lang="en-US" sz="800" dirty="0" smtClean="0"/>
+              <a:t>  pK</a:t>
+            </a:r>
+            <a:r>
+              <a:rPr lang="en-US" sz="1000" baseline="-25000" dirty="0" smtClean="0"/>
+              <a:t>a3</a:t>
+            </a:r>
+            <a:r>
+              <a:rPr lang="en-US" sz="800" dirty="0" smtClean="0"/>
+              <a:t>   11.02 ± 0.04</a:t>
             </a:r>
           </a:p>
           <a:p>
@@ -4715,8 +4615,8 @@
         </p:nvSpPr>
         <p:spPr>
           <a:xfrm>
-            <a:off x="2926767" y="6786557"/>
-            <a:ext cx="895047" cy="461665"/>
+            <a:off x="2942121" y="6786557"/>
+            <a:ext cx="864339" cy="461665"/>
           </a:xfrm>
           <a:prstGeom prst="rect">
             <a:avLst/>
@@ -4739,15 +4639,15 @@
             <a:pPr algn="ctr"/>
             <a:r>
               <a:rPr lang="en-US" sz="800" dirty="0" smtClean="0"/>
-              <a:t>pKa   9.56 </a:t>
-            </a:r>
-            <a:r>
-              <a:rPr lang="en-US" sz="800" dirty="0" smtClean="0"/>
-              <a:t>± </a:t>
-            </a:r>
-            <a:r>
-              <a:rPr lang="en-US" sz="800" dirty="0" smtClean="0"/>
-              <a:t>0.02</a:t>
+              <a:t>pK</a:t>
+            </a:r>
+            <a:r>
+              <a:rPr lang="en-US" sz="1000" baseline="-25000" dirty="0" smtClean="0"/>
+              <a:t>a</a:t>
+            </a:r>
+            <a:r>
+              <a:rPr lang="en-US" sz="800" dirty="0" smtClean="0"/>
+              <a:t>   9.56 ± 0.02</a:t>
             </a:r>
           </a:p>
           <a:p>
@@ -4764,8 +4664,8 @@
         </p:nvSpPr>
         <p:spPr>
           <a:xfrm>
-            <a:off x="4896499" y="6786557"/>
-            <a:ext cx="895047" cy="461665"/>
+            <a:off x="4911853" y="6786557"/>
+            <a:ext cx="864339" cy="461665"/>
           </a:xfrm>
           <a:prstGeom prst="rect">
             <a:avLst/>
@@ -4788,15 +4688,15 @@
             <a:pPr algn="ctr"/>
             <a:r>
               <a:rPr lang="en-US" sz="800" dirty="0" smtClean="0"/>
-              <a:t>pKa   5.70 </a:t>
-            </a:r>
-            <a:r>
-              <a:rPr lang="en-US" sz="800" dirty="0" smtClean="0"/>
-              <a:t>± </a:t>
-            </a:r>
-            <a:r>
-              <a:rPr lang="en-US" sz="800" dirty="0" smtClean="0"/>
-              <a:t>0.03</a:t>
+              <a:t>pK</a:t>
+            </a:r>
+            <a:r>
+              <a:rPr lang="en-US" sz="1000" baseline="-25000" dirty="0" smtClean="0"/>
+              <a:t>a</a:t>
+            </a:r>
+            <a:r>
+              <a:rPr lang="en-US" sz="800" dirty="0" smtClean="0"/>
+              <a:t>   5.70 ± 0.03</a:t>
             </a:r>
           </a:p>
           <a:p>
@@ -4813,8 +4713,8 @@
         </p:nvSpPr>
         <p:spPr>
           <a:xfrm>
-            <a:off x="510275" y="8673676"/>
-            <a:ext cx="895047" cy="461665"/>
+            <a:off x="525629" y="8673676"/>
+            <a:ext cx="864339" cy="461665"/>
           </a:xfrm>
           <a:prstGeom prst="rect">
             <a:avLst/>
@@ -4837,13 +4737,16 @@
             <a:pPr algn="ctr"/>
             <a:r>
               <a:rPr lang="en-US" sz="800" dirty="0" smtClean="0"/>
-              <a:t>pKa   4.10 ± </a:t>
-            </a:r>
-            <a:r>
-              <a:rPr lang="en-US" sz="800" dirty="0" smtClean="0"/>
-              <a:t>0.01</a:t>
-            </a:r>
-            <a:endParaRPr lang="en-US" sz="800" dirty="0" smtClean="0"/>
+              <a:t>pK</a:t>
+            </a:r>
+            <a:r>
+              <a:rPr lang="en-US" sz="1000" baseline="-25000" dirty="0" smtClean="0"/>
+              <a:t>a</a:t>
+            </a:r>
+            <a:r>
+              <a:rPr lang="en-US" sz="800" dirty="0" smtClean="0"/>
+              <a:t>   4.10 ± 0.01</a:t>
+            </a:r>
           </a:p>
           <a:p>
             <a:pPr algn="ctr"/>
@@ -4883,44 +4786,35 @@
             <a:pPr algn="ctr"/>
             <a:r>
               <a:rPr lang="en-US" sz="800" dirty="0" smtClean="0"/>
-              <a:t>pKa</a:t>
-            </a:r>
-            <a:r>
-              <a:rPr lang="en-US" sz="800" baseline="-25000" dirty="0" smtClean="0"/>
-              <a:t>1</a:t>
-            </a:r>
-            <a:r>
-              <a:rPr lang="en-US" sz="800" dirty="0" smtClean="0"/>
-              <a:t>   2.40 </a:t>
-            </a:r>
-            <a:r>
-              <a:rPr lang="en-US" sz="800" dirty="0" smtClean="0"/>
-              <a:t>± </a:t>
-            </a:r>
-            <a:r>
-              <a:rPr lang="en-US" sz="800" dirty="0" smtClean="0"/>
-              <a:t>0.02</a:t>
-            </a:r>
-          </a:p>
-          <a:p>
-            <a:pPr algn="ctr"/>
-            <a:r>
-              <a:rPr lang="en-US" sz="800" dirty="0" smtClean="0"/>
-              <a:t>pKa</a:t>
-            </a:r>
-            <a:r>
-              <a:rPr lang="en-US" sz="800" baseline="-25000" dirty="0"/>
+              <a:t>pK</a:t>
+            </a:r>
+            <a:r>
+              <a:rPr lang="en-US" sz="1000" baseline="-25000" dirty="0" smtClean="0"/>
+              <a:t>a1</a:t>
+            </a:r>
+            <a:r>
+              <a:rPr lang="en-US" sz="800" dirty="0" smtClean="0"/>
+              <a:t>   2.40 ± 0.02</a:t>
+            </a:r>
+          </a:p>
+          <a:p>
+            <a:pPr algn="ctr"/>
+            <a:r>
+              <a:rPr lang="en-US" sz="800" dirty="0" smtClean="0"/>
+              <a:t>pK</a:t>
+            </a:r>
+            <a:r>
+              <a:rPr lang="en-US" sz="1000" baseline="-25000" dirty="0" smtClean="0"/>
+              <a:t>a</a:t>
+            </a:r>
+            <a:r>
+              <a:rPr lang="en-US" sz="1000" baseline="-25000" dirty="0"/>
               <a:t>2</a:t>
             </a:r>
             <a:r>
               <a:rPr lang="en-US" sz="800" dirty="0" smtClean="0"/>
-              <a:t>   7.43 ± </a:t>
-            </a:r>
-            <a:r>
-              <a:rPr lang="en-US" sz="800" dirty="0" smtClean="0"/>
-              <a:t>0.01</a:t>
-            </a:r>
-            <a:endParaRPr lang="en-US" sz="800" dirty="0" smtClean="0"/>
+              <a:t>   7.43 ± 0.01</a:t>
+            </a:r>
           </a:p>
           <a:p>
             <a:pPr algn="ctr"/>
@@ -4940,8 +4834,8 @@
         </p:nvSpPr>
         <p:spPr>
           <a:xfrm>
-            <a:off x="3458074" y="8673676"/>
-            <a:ext cx="895047" cy="584776"/>
+            <a:off x="3473428" y="8673676"/>
+            <a:ext cx="864339" cy="584776"/>
           </a:xfrm>
           <a:prstGeom prst="rect">
             <a:avLst/>
@@ -4964,13 +4858,16 @@
             <a:pPr algn="ctr"/>
             <a:r>
               <a:rPr lang="en-US" sz="800" dirty="0" smtClean="0"/>
-              <a:t>pKa   5.45 ± </a:t>
-            </a:r>
-            <a:r>
-              <a:rPr lang="en-US" sz="800" dirty="0" smtClean="0"/>
-              <a:t>0.01</a:t>
-            </a:r>
-            <a:endParaRPr lang="en-US" sz="800" dirty="0" smtClean="0"/>
+              <a:t>pK</a:t>
+            </a:r>
+            <a:r>
+              <a:rPr lang="en-US" sz="1000" baseline="-25000" dirty="0" smtClean="0"/>
+              <a:t>a</a:t>
+            </a:r>
+            <a:r>
+              <a:rPr lang="en-US" sz="800" dirty="0" smtClean="0"/>
+              <a:t>   5.45 ± 0.01</a:t>
+            </a:r>
           </a:p>
           <a:p>
             <a:pPr algn="ctr"/>
@@ -4990,8 +4887,8 @@
         </p:nvSpPr>
         <p:spPr>
           <a:xfrm>
-            <a:off x="5330769" y="8673676"/>
-            <a:ext cx="895047" cy="584776"/>
+            <a:off x="5346123" y="8673676"/>
+            <a:ext cx="864339" cy="584776"/>
           </a:xfrm>
           <a:prstGeom prst="rect">
             <a:avLst/>
@@ -5014,15 +4911,15 @@
             <a:pPr algn="ctr"/>
             <a:r>
               <a:rPr lang="en-US" sz="800" dirty="0" smtClean="0"/>
-              <a:t>pKa   2.60 </a:t>
-            </a:r>
-            <a:r>
-              <a:rPr lang="en-US" sz="800" dirty="0" smtClean="0"/>
-              <a:t>± </a:t>
-            </a:r>
-            <a:r>
-              <a:rPr lang="en-US" sz="800" dirty="0" smtClean="0"/>
-              <a:t>0.01</a:t>
+              <a:t>pK</a:t>
+            </a:r>
+            <a:r>
+              <a:rPr lang="en-US" sz="1000" baseline="-25000" dirty="0" smtClean="0"/>
+              <a:t>a</a:t>
+            </a:r>
+            <a:r>
+              <a:rPr lang="en-US" sz="800" dirty="0" smtClean="0"/>
+              <a:t>   2.60 ± 0.01</a:t>
             </a:r>
           </a:p>
           <a:p>

</xml_diff>

<commit_message>
DRAFT3 - coauthor edits, version sent to TS
</commit_message>
<xml_diff>
--- a/figures/chemical_structures_figure/SAMPL6_pKa_molecules_fig.pptx
+++ b/figures/chemical_structures_figure/SAMPL6_pKa_molecules_fig.pptx
@@ -288,7 +288,7 @@
           <a:p>
             <a:fld id="{5CCE303C-61B3-6B4B-86C2-B0455BB704B3}" type="datetimeFigureOut">
               <a:rPr lang="en-US" smtClean="0"/>
-              <a:t>6/7/18</a:t>
+              <a:t>6/14/18</a:t>
             </a:fld>
             <a:endParaRPr lang="en-US"/>
           </a:p>
@@ -458,7 +458,7 @@
           <a:p>
             <a:fld id="{5CCE303C-61B3-6B4B-86C2-B0455BB704B3}" type="datetimeFigureOut">
               <a:rPr lang="en-US" smtClean="0"/>
-              <a:t>6/7/18</a:t>
+              <a:t>6/14/18</a:t>
             </a:fld>
             <a:endParaRPr lang="en-US"/>
           </a:p>
@@ -638,7 +638,7 @@
           <a:p>
             <a:fld id="{5CCE303C-61B3-6B4B-86C2-B0455BB704B3}" type="datetimeFigureOut">
               <a:rPr lang="en-US" smtClean="0"/>
-              <a:t>6/7/18</a:t>
+              <a:t>6/14/18</a:t>
             </a:fld>
             <a:endParaRPr lang="en-US"/>
           </a:p>
@@ -808,7 +808,7 @@
           <a:p>
             <a:fld id="{5CCE303C-61B3-6B4B-86C2-B0455BB704B3}" type="datetimeFigureOut">
               <a:rPr lang="en-US" smtClean="0"/>
-              <a:t>6/7/18</a:t>
+              <a:t>6/14/18</a:t>
             </a:fld>
             <a:endParaRPr lang="en-US"/>
           </a:p>
@@ -1054,7 +1054,7 @@
           <a:p>
             <a:fld id="{5CCE303C-61B3-6B4B-86C2-B0455BB704B3}" type="datetimeFigureOut">
               <a:rPr lang="en-US" smtClean="0"/>
-              <a:t>6/7/18</a:t>
+              <a:t>6/14/18</a:t>
             </a:fld>
             <a:endParaRPr lang="en-US"/>
           </a:p>
@@ -1342,7 +1342,7 @@
           <a:p>
             <a:fld id="{5CCE303C-61B3-6B4B-86C2-B0455BB704B3}" type="datetimeFigureOut">
               <a:rPr lang="en-US" smtClean="0"/>
-              <a:t>6/7/18</a:t>
+              <a:t>6/14/18</a:t>
             </a:fld>
             <a:endParaRPr lang="en-US"/>
           </a:p>
@@ -1764,7 +1764,7 @@
           <a:p>
             <a:fld id="{5CCE303C-61B3-6B4B-86C2-B0455BB704B3}" type="datetimeFigureOut">
               <a:rPr lang="en-US" smtClean="0"/>
-              <a:t>6/7/18</a:t>
+              <a:t>6/14/18</a:t>
             </a:fld>
             <a:endParaRPr lang="en-US"/>
           </a:p>
@@ -1882,7 +1882,7 @@
           <a:p>
             <a:fld id="{5CCE303C-61B3-6B4B-86C2-B0455BB704B3}" type="datetimeFigureOut">
               <a:rPr lang="en-US" smtClean="0"/>
-              <a:t>6/7/18</a:t>
+              <a:t>6/14/18</a:t>
             </a:fld>
             <a:endParaRPr lang="en-US"/>
           </a:p>
@@ -1977,7 +1977,7 @@
           <a:p>
             <a:fld id="{5CCE303C-61B3-6B4B-86C2-B0455BB704B3}" type="datetimeFigureOut">
               <a:rPr lang="en-US" smtClean="0"/>
-              <a:t>6/7/18</a:t>
+              <a:t>6/14/18</a:t>
             </a:fld>
             <a:endParaRPr lang="en-US"/>
           </a:p>
@@ -2254,7 +2254,7 @@
           <a:p>
             <a:fld id="{5CCE303C-61B3-6B4B-86C2-B0455BB704B3}" type="datetimeFigureOut">
               <a:rPr lang="en-US" smtClean="0"/>
-              <a:t>6/7/18</a:t>
+              <a:t>6/14/18</a:t>
             </a:fld>
             <a:endParaRPr lang="en-US"/>
           </a:p>
@@ -2507,7 +2507,7 @@
           <a:p>
             <a:fld id="{5CCE303C-61B3-6B4B-86C2-B0455BB704B3}" type="datetimeFigureOut">
               <a:rPr lang="en-US" smtClean="0"/>
-              <a:t>6/7/18</a:t>
+              <a:t>6/14/18</a:t>
             </a:fld>
             <a:endParaRPr lang="en-US"/>
           </a:p>
@@ -2720,7 +2720,7 @@
           <a:p>
             <a:fld id="{5CCE303C-61B3-6B4B-86C2-B0455BB704B3}" type="datetimeFigureOut">
               <a:rPr lang="en-US" smtClean="0"/>
-              <a:t>6/7/18</a:t>
+              <a:t>6/14/18</a:t>
             </a:fld>
             <a:endParaRPr lang="en-US"/>
           </a:p>
@@ -3703,7 +3703,15 @@
             <a:pPr algn="ctr"/>
             <a:r>
               <a:rPr lang="en-US" sz="800" dirty="0" smtClean="0"/>
-              <a:t>pKa  9.53 ± 0.01</a:t>
+              <a:t>pK</a:t>
+            </a:r>
+            <a:r>
+              <a:rPr lang="en-US" sz="1000" baseline="-25000" dirty="0" smtClean="0"/>
+              <a:t>a</a:t>
+            </a:r>
+            <a:r>
+              <a:rPr lang="en-US" sz="800" dirty="0" smtClean="0"/>
+              <a:t>  9.53 ± 0.01</a:t>
             </a:r>
           </a:p>
           <a:p>
@@ -3744,7 +3752,15 @@
             <a:pPr algn="ctr"/>
             <a:r>
               <a:rPr lang="en-US" sz="800" dirty="0" smtClean="0"/>
-              <a:t>pKa  5.03 ± 0.01</a:t>
+              <a:t>pK</a:t>
+            </a:r>
+            <a:r>
+              <a:rPr lang="en-US" sz="1000" baseline="-25000" dirty="0" smtClean="0"/>
+              <a:t>a</a:t>
+            </a:r>
+            <a:r>
+              <a:rPr lang="en-US" sz="800" dirty="0" smtClean="0"/>
+              <a:t>  5.03 ± 0.01</a:t>
             </a:r>
           </a:p>
           <a:p>
@@ -3761,8 +3777,8 @@
         </p:nvSpPr>
         <p:spPr>
           <a:xfrm>
-            <a:off x="2358800" y="1265339"/>
-            <a:ext cx="877163" cy="461665"/>
+            <a:off x="2377147" y="1265339"/>
+            <a:ext cx="840469" cy="461665"/>
           </a:xfrm>
           <a:prstGeom prst="rect">
             <a:avLst/>
@@ -3785,7 +3801,15 @@
             <a:pPr algn="ctr"/>
             <a:r>
               <a:rPr lang="en-US" sz="800" dirty="0" smtClean="0"/>
-              <a:t>pKa  7.02 ± 0.01</a:t>
+              <a:t>pK</a:t>
+            </a:r>
+            <a:r>
+              <a:rPr lang="en-US" sz="1000" baseline="-25000" dirty="0" smtClean="0"/>
+              <a:t>a</a:t>
+            </a:r>
+            <a:r>
+              <a:rPr lang="en-US" sz="800" dirty="0" smtClean="0"/>
+              <a:t>  7.02 ± 0.01</a:t>
             </a:r>
           </a:p>
           <a:p>
@@ -3802,8 +3826,8 @@
         </p:nvSpPr>
         <p:spPr>
           <a:xfrm>
-            <a:off x="3640897" y="1265339"/>
-            <a:ext cx="877163" cy="461665"/>
+            <a:off x="3659244" y="1265339"/>
+            <a:ext cx="840469" cy="461665"/>
           </a:xfrm>
           <a:prstGeom prst="rect">
             <a:avLst/>
@@ -3826,7 +3850,15 @@
             <a:pPr algn="ctr"/>
             <a:r>
               <a:rPr lang="en-US" sz="800" dirty="0" smtClean="0"/>
-              <a:t>pKa  6.02 ± 0.01</a:t>
+              <a:t>pK</a:t>
+            </a:r>
+            <a:r>
+              <a:rPr lang="en-US" sz="1000" baseline="-25000" dirty="0" smtClean="0"/>
+              <a:t>a</a:t>
+            </a:r>
+            <a:r>
+              <a:rPr lang="en-US" sz="800" dirty="0" smtClean="0"/>
+              <a:t>  6.02 ± 0.01</a:t>
             </a:r>
           </a:p>
           <a:p>
@@ -3843,8 +3875,8 @@
         </p:nvSpPr>
         <p:spPr>
           <a:xfrm>
-            <a:off x="4786457" y="1265339"/>
-            <a:ext cx="877163" cy="461665"/>
+            <a:off x="4804804" y="1265339"/>
+            <a:ext cx="840469" cy="461665"/>
           </a:xfrm>
           <a:prstGeom prst="rect">
             <a:avLst/>
@@ -3867,7 +3899,15 @@
             <a:pPr algn="ctr"/>
             <a:r>
               <a:rPr lang="en-US" sz="800" dirty="0" smtClean="0"/>
-              <a:t>pKa  4.59 ± 0.01</a:t>
+              <a:t>pK</a:t>
+            </a:r>
+            <a:r>
+              <a:rPr lang="en-US" sz="1000" baseline="-25000" dirty="0" smtClean="0"/>
+              <a:t>a</a:t>
+            </a:r>
+            <a:r>
+              <a:rPr lang="en-US" sz="800" dirty="0" smtClean="0"/>
+              <a:t>  4.59 ± 0.01</a:t>
             </a:r>
           </a:p>
           <a:p>
@@ -3884,8 +3924,8 @@
         </p:nvSpPr>
         <p:spPr>
           <a:xfrm>
-            <a:off x="5953325" y="1265339"/>
-            <a:ext cx="981709" cy="707886"/>
+            <a:off x="5964684" y="1265339"/>
+            <a:ext cx="958991" cy="707886"/>
           </a:xfrm>
           <a:prstGeom prst="rect">
             <a:avLst/>
@@ -3908,11 +3948,11 @@
             <a:pPr algn="ctr"/>
             <a:r>
               <a:rPr lang="en-US" sz="800" dirty="0" smtClean="0"/>
-              <a:t>pKa</a:t>
-            </a:r>
-            <a:r>
-              <a:rPr lang="en-US" sz="800" baseline="-25000" dirty="0" smtClean="0"/>
-              <a:t>1</a:t>
+              <a:t>pK</a:t>
+            </a:r>
+            <a:r>
+              <a:rPr lang="en-US" sz="1000" baseline="-25000" dirty="0" smtClean="0"/>
+              <a:t>a1</a:t>
             </a:r>
             <a:r>
               <a:rPr lang="en-US" sz="800" dirty="0" smtClean="0"/>
@@ -3923,11 +3963,11 @@
             <a:pPr algn="ctr"/>
             <a:r>
               <a:rPr lang="en-US" sz="800" dirty="0" smtClean="0"/>
-              <a:t> pKa</a:t>
-            </a:r>
-            <a:r>
-              <a:rPr lang="en-US" sz="800" baseline="-25000" dirty="0" smtClean="0"/>
-              <a:t>2</a:t>
+              <a:t> pK</a:t>
+            </a:r>
+            <a:r>
+              <a:rPr lang="en-US" sz="1000" baseline="-25000" dirty="0" smtClean="0"/>
+              <a:t>a2</a:t>
             </a:r>
             <a:r>
               <a:rPr lang="en-US" sz="800" dirty="0" smtClean="0"/>

</xml_diff>